<commit_message>
added qr code to project presentation
</commit_message>
<xml_diff>
--- a/designdoc/basnya_final.pptx
+++ b/designdoc/basnya_final.pptx
@@ -59,7 +59,7 @@
         <p:txBody>
           <a:bodyPr/>
           <a:p>
-            <a:fld id="{204AF21B-358A-4D92-868B-D265029014A7}" type="slidenum">
+            <a:fld id="{C9AED1DD-4567-4720-AB0A-1AB97D464B5D}" type="slidenum">
               <a:t>&lt;#&gt;</a:t>
             </a:fld>
           </a:p>
@@ -206,7 +206,7 @@
         <p:txBody>
           <a:bodyPr/>
           <a:p>
-            <a:fld id="{D13CBF3C-BAA8-4696-A14D-B66DE0D54AA3}" type="slidenum">
+            <a:fld id="{7FA1A52F-4438-4D60-8335-94542FF55595}" type="slidenum">
               <a:t>&lt;#&gt;</a:t>
             </a:fld>
           </a:p>
@@ -421,7 +421,7 @@
         <p:txBody>
           <a:bodyPr/>
           <a:p>
-            <a:fld id="{0A17C3D3-C9C1-4198-8DD5-418616611038}" type="slidenum">
+            <a:fld id="{F8FE5738-DCC8-4A82-9A25-1185639A6C70}" type="slidenum">
               <a:t>&lt;#&gt;</a:t>
             </a:fld>
           </a:p>
@@ -704,7 +704,7 @@
         <p:txBody>
           <a:bodyPr/>
           <a:p>
-            <a:fld id="{DD7B142F-78AA-442F-9AEF-74BB8451B6B1}" type="slidenum">
+            <a:fld id="{8B9E0CC5-593F-4FAB-A66E-A15DC3F2639D}" type="slidenum">
               <a:t>&lt;#&gt;</a:t>
             </a:fld>
           </a:p>
@@ -746,7 +746,7 @@
         <p:txBody>
           <a:bodyPr/>
           <a:p>
-            <a:fld id="{EA92DD94-8F05-4A6B-A8D1-7FB06CD7575A}" type="slidenum">
+            <a:fld id="{1FF29C2E-8216-4049-BDDB-77A58D3A0C05}" type="slidenum">
               <a:t>&lt;#&gt;</a:t>
             </a:fld>
           </a:p>
@@ -862,7 +862,7 @@
         <p:txBody>
           <a:bodyPr/>
           <a:p>
-            <a:fld id="{89AE42D3-7196-4DDA-8784-2D1A54A6EC56}" type="slidenum">
+            <a:fld id="{691C7D77-5834-45B3-B652-5005B97AA4D0}" type="slidenum">
               <a:t>&lt;#&gt;</a:t>
             </a:fld>
           </a:p>
@@ -975,7 +975,7 @@
         <p:txBody>
           <a:bodyPr/>
           <a:p>
-            <a:fld id="{22EC9D6C-F82F-4B90-B743-C57D660FCAAF}" type="slidenum">
+            <a:fld id="{B51FC813-716D-4BD8-8552-FDABFAC0331C}" type="slidenum">
               <a:t>&lt;#&gt;</a:t>
             </a:fld>
           </a:p>
@@ -1122,7 +1122,7 @@
         <p:txBody>
           <a:bodyPr/>
           <a:p>
-            <a:fld id="{BAA82AC3-E27B-4660-97A6-567F7905783A}" type="slidenum">
+            <a:fld id="{0AA5E8A7-9B4B-4BCA-905B-93755677969F}" type="slidenum">
               <a:t>&lt;#&gt;</a:t>
             </a:fld>
           </a:p>
@@ -1201,7 +1201,7 @@
         <p:txBody>
           <a:bodyPr/>
           <a:p>
-            <a:fld id="{FEFD2DF0-48FC-4A69-8197-864A130B4C7F}" type="slidenum">
+            <a:fld id="{CB565DCA-DFE8-4C56-9751-592A61324DB0}" type="slidenum">
               <a:t>&lt;#&gt;</a:t>
             </a:fld>
           </a:p>
@@ -1280,7 +1280,7 @@
         <p:txBody>
           <a:bodyPr/>
           <a:p>
-            <a:fld id="{EF6995A3-F125-4AB3-835E-F95EC744CF03}" type="slidenum">
+            <a:fld id="{E30680B2-74FE-437A-A7B6-202ED21C5EE8}" type="slidenum">
               <a:t>&lt;#&gt;</a:t>
             </a:fld>
           </a:p>
@@ -1461,7 +1461,7 @@
         <p:txBody>
           <a:bodyPr/>
           <a:p>
-            <a:fld id="{66F78A82-6A76-4362-86D4-1F20953C170E}" type="slidenum">
+            <a:fld id="{BCCD1CC8-2BA5-49DC-AB6F-AC53BA6E0239}" type="slidenum">
               <a:t>&lt;#&gt;</a:t>
             </a:fld>
           </a:p>
@@ -1577,7 +1577,7 @@
         <p:txBody>
           <a:bodyPr/>
           <a:p>
-            <a:fld id="{298A008D-199C-45A3-B393-A31833488ADA}" type="slidenum">
+            <a:fld id="{3CB48AAB-9287-44E8-B2FB-44068F50F45D}" type="slidenum">
               <a:t>&lt;#&gt;</a:t>
             </a:fld>
           </a:p>
@@ -1758,7 +1758,7 @@
         <p:txBody>
           <a:bodyPr/>
           <a:p>
-            <a:fld id="{F54FE7B1-049D-4AE5-897F-E080981708F7}" type="slidenum">
+            <a:fld id="{79747DF2-B6B3-41CE-809B-CCFF91F1F8AF}" type="slidenum">
               <a:t>&lt;#&gt;</a:t>
             </a:fld>
           </a:p>
@@ -1939,7 +1939,7 @@
         <p:txBody>
           <a:bodyPr/>
           <a:p>
-            <a:fld id="{473D491C-7E4D-4C16-AB73-BFC8FBD7391E}" type="slidenum">
+            <a:fld id="{CC4806C6-9A0A-4FEE-858C-FD46687A698A}" type="slidenum">
               <a:t>&lt;#&gt;</a:t>
             </a:fld>
           </a:p>
@@ -2086,7 +2086,7 @@
         <p:txBody>
           <a:bodyPr/>
           <a:p>
-            <a:fld id="{9729044D-5F17-406A-BB03-83ED96AD27E4}" type="slidenum">
+            <a:fld id="{17C57EF5-8767-485B-93A1-ECF8890A0992}" type="slidenum">
               <a:t>&lt;#&gt;</a:t>
             </a:fld>
           </a:p>
@@ -2301,7 +2301,7 @@
         <p:txBody>
           <a:bodyPr/>
           <a:p>
-            <a:fld id="{6CCBBE10-209A-46C7-A268-1FA8D4F478EC}" type="slidenum">
+            <a:fld id="{8BE91F44-6B88-4DB2-A4AA-73D77929361B}" type="slidenum">
               <a:t>&lt;#&gt;</a:t>
             </a:fld>
           </a:p>
@@ -2584,7 +2584,7 @@
         <p:txBody>
           <a:bodyPr/>
           <a:p>
-            <a:fld id="{7C6EA4B4-6C03-4136-9EA4-6920969A9986}" type="slidenum">
+            <a:fld id="{F714C62E-8BFC-41E9-9BEA-539B0DF7515D}" type="slidenum">
               <a:t>&lt;#&gt;</a:t>
             </a:fld>
           </a:p>
@@ -2697,7 +2697,7 @@
         <p:txBody>
           <a:bodyPr/>
           <a:p>
-            <a:fld id="{5F9090BC-5E00-4460-BACA-16BAA85B27FB}" type="slidenum">
+            <a:fld id="{C4F96ED5-B8F3-47EB-B244-FFFD2BE86D5B}" type="slidenum">
               <a:t>&lt;#&gt;</a:t>
             </a:fld>
           </a:p>
@@ -2844,7 +2844,7 @@
         <p:txBody>
           <a:bodyPr/>
           <a:p>
-            <a:fld id="{D01B2CFB-CC2C-4FE9-B325-A0ABBB745574}" type="slidenum">
+            <a:fld id="{2206270C-59DA-4013-BD0F-C5B0FBFE5CF8}" type="slidenum">
               <a:t>&lt;#&gt;</a:t>
             </a:fld>
           </a:p>
@@ -2923,7 +2923,7 @@
         <p:txBody>
           <a:bodyPr/>
           <a:p>
-            <a:fld id="{5D0817C5-0CD8-4C90-873B-FDA97748643D}" type="slidenum">
+            <a:fld id="{0E274B9A-9E95-4516-8A14-0E258DE69BD1}" type="slidenum">
               <a:t>&lt;#&gt;</a:t>
             </a:fld>
           </a:p>
@@ -3002,7 +3002,7 @@
         <p:txBody>
           <a:bodyPr/>
           <a:p>
-            <a:fld id="{8B4D0373-1B65-49FC-8CAE-3B50C58C67B4}" type="slidenum">
+            <a:fld id="{67C5DEEA-E22E-420D-B108-7C9AAF1261F9}" type="slidenum">
               <a:t>&lt;#&gt;</a:t>
             </a:fld>
           </a:p>
@@ -3183,7 +3183,7 @@
         <p:txBody>
           <a:bodyPr/>
           <a:p>
-            <a:fld id="{F67C6538-5952-473F-BF67-02D0BF0F5882}" type="slidenum">
+            <a:fld id="{DE06128A-CD8B-46CF-86C5-98AF51D84D7A}" type="slidenum">
               <a:t>&lt;#&gt;</a:t>
             </a:fld>
           </a:p>
@@ -3364,7 +3364,7 @@
         <p:txBody>
           <a:bodyPr/>
           <a:p>
-            <a:fld id="{2C1104B7-2B01-45AA-A5FF-C3EF61253B40}" type="slidenum">
+            <a:fld id="{FC7B84B7-DC1A-4285-8082-28EA647F21CE}" type="slidenum">
               <a:t>&lt;#&gt;</a:t>
             </a:fld>
           </a:p>
@@ -3545,7 +3545,7 @@
         <p:txBody>
           <a:bodyPr/>
           <a:p>
-            <a:fld id="{3028364F-0F75-48A9-B9DC-BA0AF0C4AA0E}" type="slidenum">
+            <a:fld id="{7E09D344-7CCA-4F36-9ECE-5728B818D23B}" type="slidenum">
               <a:t>&lt;#&gt;</a:t>
             </a:fld>
           </a:p>
@@ -3593,7 +3593,7 @@
         <p:spPr>
           <a:xfrm>
             <a:off x="20574000" y="12344400"/>
-            <a:ext cx="2742120" cy="684720"/>
+            <a:ext cx="2741760" cy="684360"/>
           </a:xfrm>
           <a:prstGeom prst="rect">
             <a:avLst/>
@@ -3635,7 +3635,7 @@
                 <a:tab algn="l" pos="0"/>
               </a:tabLst>
             </a:pPr>
-            <a:fld id="{3F1AF58D-944E-4210-B285-EE908C79D4A3}" type="slidenum">
+            <a:fld id="{E834F720-FC6E-49AE-9071-371B08719878}" type="slidenum">
               <a:rPr b="0" lang="en-US" sz="2800" spc="-1" strike="noStrike">
                 <a:solidFill>
                   <a:srgbClr val="000000"/>
@@ -3934,7 +3934,7 @@
         <p:spPr>
           <a:xfrm>
             <a:off x="20345400" y="12290040"/>
-            <a:ext cx="3038400" cy="967680"/>
+            <a:ext cx="3038040" cy="967320"/>
           </a:xfrm>
           <a:prstGeom prst="rect">
             <a:avLst/>
@@ -3976,7 +3976,7 @@
                 <a:tab algn="l" pos="0"/>
               </a:tabLst>
             </a:pPr>
-            <a:fld id="{8AE51244-6BE5-4003-A944-CCD4270EDCEE}" type="slidenum">
+            <a:fld id="{AA53E9EE-BDB3-49D3-8183-FFB4636B6934}" type="slidenum">
               <a:rPr b="0" lang="en-US" sz="2800" spc="-1" strike="noStrike">
                 <a:solidFill>
                   <a:srgbClr val="000000"/>
@@ -4264,7 +4264,7 @@
         <p:spPr>
           <a:xfrm>
             <a:off x="2781360" y="1333440"/>
-            <a:ext cx="27589320" cy="11047680"/>
+            <a:ext cx="27588960" cy="11047320"/>
           </a:xfrm>
           <a:prstGeom prst="roundRect">
             <a:avLst>
@@ -4296,7 +4296,7 @@
         <p:spPr>
           <a:xfrm>
             <a:off x="3706920" y="2119320"/>
-            <a:ext cx="9399600" cy="9399600"/>
+            <a:ext cx="9399240" cy="9399240"/>
           </a:xfrm>
           <a:prstGeom prst="ellipse">
             <a:avLst/>
@@ -4324,7 +4324,7 @@
         <p:spPr>
           <a:xfrm>
             <a:off x="5706360" y="5685120"/>
-            <a:ext cx="5124600" cy="1624680"/>
+            <a:ext cx="5124240" cy="1624680"/>
           </a:xfrm>
           <a:prstGeom prst="rect">
             <a:avLst/>
@@ -4379,7 +4379,7 @@
         <p:spPr>
           <a:xfrm>
             <a:off x="6026760" y="7139160"/>
-            <a:ext cx="4483440" cy="1929240"/>
+            <a:ext cx="4483080" cy="1929240"/>
           </a:xfrm>
           <a:prstGeom prst="rect">
             <a:avLst/>
@@ -4439,7 +4439,7 @@
         <p:txBody>
           <a:bodyPr/>
           <a:p>
-            <a:fld id="{4FC16E30-5B49-4269-927F-EACBE8E2B531}" type="slidenum">
+            <a:fld id="{0535E1C8-D2ED-494D-9888-427442905F8D}" type="slidenum">
               <a:t>1</a:t>
             </a:fld>
           </a:p>
@@ -4477,14 +4477,14 @@
       </p:grpSpPr>
       <p:sp>
         <p:nvSpPr>
-          <p:cNvPr id="107" name="Title text slide 8"/>
+          <p:cNvPr id="108" name="Title text slide 8"/>
           <p:cNvSpPr/>
           <p:nvPr/>
         </p:nvSpPr>
         <p:spPr>
           <a:xfrm>
-            <a:off x="2394720" y="2072160"/>
-            <a:ext cx="19549800" cy="1321200"/>
+            <a:off x="2394720" y="2072880"/>
+            <a:ext cx="19549440" cy="1319760"/>
           </a:xfrm>
           <a:prstGeom prst="rect">
             <a:avLst/>
@@ -4532,7 +4532,7 @@
       </p:sp>
       <p:pic>
         <p:nvPicPr>
-          <p:cNvPr id="108" name="" descr=""/>
+          <p:cNvPr id="109" name="" descr=""/>
           <p:cNvPicPr/>
           <p:nvPr/>
         </p:nvPicPr>
@@ -4543,7 +4543,7 @@
         <p:spPr>
           <a:xfrm>
             <a:off x="1976040" y="4114800"/>
-            <a:ext cx="20431440" cy="7772400"/>
+            <a:ext cx="20431080" cy="7772040"/>
           </a:xfrm>
           <a:prstGeom prst="rect">
             <a:avLst/>
@@ -4567,7 +4567,7 @@
         <p:txBody>
           <a:bodyPr/>
           <a:p>
-            <a:fld id="{821B97F8-3C02-43F8-BC51-FDC24762B8D4}" type="slidenum">
+            <a:fld id="{0B3A3F7E-9E70-4364-AF60-F51DFA50234B}" type="slidenum">
               <a:t>10</a:t>
             </a:fld>
           </a:p>
@@ -4605,14 +4605,14 @@
       </p:grpSpPr>
       <p:sp>
         <p:nvSpPr>
-          <p:cNvPr id="109" name="Title text slide"/>
+          <p:cNvPr id="110" name="Title text slide"/>
           <p:cNvSpPr/>
           <p:nvPr/>
         </p:nvSpPr>
         <p:spPr>
           <a:xfrm>
             <a:off x="2394720" y="2072880"/>
-            <a:ext cx="9110880" cy="1319760"/>
+            <a:ext cx="9110520" cy="1319760"/>
           </a:xfrm>
           <a:prstGeom prst="rect">
             <a:avLst/>
@@ -4660,14 +4660,14 @@
       </p:sp>
       <p:sp>
         <p:nvSpPr>
-          <p:cNvPr id="110" name="Lorem ipsum dolor sit amet, consectetur adipiscing elit, sed do eiusmod tempor incididunt ut labore et dolore magna aliqua. Ut enim ad minim veniam, quis nostrud exercitation ullamco laboris nisi ut aliquip ex ea commodo consequat. Duis aute irure dolor in reprehenderit in voluptate velit esse cillum dolore eu fugiat nulla pariatur. Excepteur sint occaecat cupidatat non proident, sunt in culpa qui officia deserunt mollit anim id est laborum.…"/>
+          <p:cNvPr id="111" name="Lorem ipsum dolor sit amet, consectetur adipiscing elit, sed do eiusmod tempor incididunt ut labore et dolore magna aliqua. Ut enim ad minim veniam, quis nostrud exercitation ullamco laboris nisi ut aliquip ex ea commodo consequat. Duis aute irure dolor in reprehenderit in voluptate velit esse cillum dolore eu fugiat nulla pariatur. Excepteur sint occaecat cupidatat non proident, sunt in culpa qui officia deserunt mollit anim id est laborum.…"/>
           <p:cNvSpPr/>
           <p:nvPr/>
         </p:nvSpPr>
         <p:spPr>
           <a:xfrm>
             <a:off x="2451240" y="5003640"/>
-            <a:ext cx="19226160" cy="4408200"/>
+            <a:ext cx="19225800" cy="4408200"/>
           </a:xfrm>
           <a:prstGeom prst="rect">
             <a:avLst/>
@@ -4838,7 +4838,7 @@
         <p:txBody>
           <a:bodyPr/>
           <a:p>
-            <a:fld id="{2787290F-752D-411A-AA3B-E1E1B7C49FB0}" type="slidenum">
+            <a:fld id="{4EF95C17-9B60-4B01-BDDA-344217E6C039}" type="slidenum">
               <a:t>11</a:t>
             </a:fld>
           </a:p>
@@ -4876,14 +4876,14 @@
       </p:grpSpPr>
       <p:sp>
         <p:nvSpPr>
-          <p:cNvPr id="111" name="Title text slide 3"/>
+          <p:cNvPr id="112" name="Title text slide 3"/>
           <p:cNvSpPr/>
           <p:nvPr/>
         </p:nvSpPr>
         <p:spPr>
           <a:xfrm>
             <a:off x="2394720" y="2072880"/>
-            <a:ext cx="19549800" cy="1319760"/>
+            <a:ext cx="19549440" cy="1319760"/>
           </a:xfrm>
           <a:prstGeom prst="rect">
             <a:avLst/>
@@ -4931,14 +4931,14 @@
       </p:sp>
       <p:sp>
         <p:nvSpPr>
-          <p:cNvPr id="112" name="Lorem ipsum dolor sit amet, consectetur adipiscing elit, sed do eiusmod tempor incididunt ut labore et dolore magna aliqua. Ut enim ad minim veniam, quis nostrud exercitation ullamco laboris nisi ut aliquip ex ea commodo consequat. Duis aute irure dolor in reprehenderit in voluptate velit esse cillum dolore eu fugiat nulla pariatur. Excepteur sint occaecat cupidatat non proident, sunt in culpa qui officia deserunt mollit anim id est laborum.… 3"/>
+          <p:cNvPr id="113" name="Lorem ipsum dolor sit amet, consectetur adipiscing elit, sed do eiusmod tempor incididunt ut labore et dolore magna aliqua. Ut enim ad minim veniam, quis nostrud exercitation ullamco laboris nisi ut aliquip ex ea commodo consequat. Duis aute irure dolor in reprehenderit in voluptate velit esse cillum dolore eu fugiat nulla pariatur. Excepteur sint occaecat cupidatat non proident, sunt in culpa qui officia deserunt mollit anim id est laborum.… 3"/>
           <p:cNvSpPr/>
           <p:nvPr/>
         </p:nvSpPr>
         <p:spPr>
           <a:xfrm>
             <a:off x="2451240" y="5003640"/>
-            <a:ext cx="19226160" cy="6232680"/>
+            <a:ext cx="19225800" cy="6232680"/>
           </a:xfrm>
           <a:prstGeom prst="rect">
             <a:avLst/>
@@ -5213,7 +5213,7 @@
         <p:txBody>
           <a:bodyPr/>
           <a:p>
-            <a:fld id="{CF2D0FE1-8E59-4886-8861-7BC5F1B2F182}" type="slidenum">
+            <a:fld id="{B7EEC018-C755-418C-837B-4F2C12C1E0BD}" type="slidenum">
               <a:t>12</a:t>
             </a:fld>
           </a:p>
@@ -5251,14 +5251,14 @@
       </p:grpSpPr>
       <p:sp>
         <p:nvSpPr>
-          <p:cNvPr id="113" name="Title text slide 4"/>
+          <p:cNvPr id="114" name="Title text slide 4"/>
           <p:cNvSpPr/>
           <p:nvPr/>
         </p:nvSpPr>
         <p:spPr>
           <a:xfrm>
             <a:off x="2394720" y="2072880"/>
-            <a:ext cx="19549800" cy="1319760"/>
+            <a:ext cx="19549440" cy="1319760"/>
           </a:xfrm>
           <a:prstGeom prst="rect">
             <a:avLst/>
@@ -5306,14 +5306,14 @@
       </p:sp>
       <p:sp>
         <p:nvSpPr>
-          <p:cNvPr id="114" name=""/>
+          <p:cNvPr id="115" name=""/>
           <p:cNvSpPr/>
           <p:nvPr/>
         </p:nvSpPr>
         <p:spPr>
           <a:xfrm>
             <a:off x="1143000" y="5486400"/>
-            <a:ext cx="2056680" cy="2056680"/>
+            <a:ext cx="2056320" cy="2056320"/>
           </a:xfrm>
           <a:prstGeom prst="flowChartMagneticDisk">
             <a:avLst/>
@@ -5362,14 +5362,14 @@
       </p:sp>
       <p:sp>
         <p:nvSpPr>
-          <p:cNvPr id="115" name=""/>
+          <p:cNvPr id="116" name=""/>
           <p:cNvSpPr/>
           <p:nvPr/>
         </p:nvSpPr>
         <p:spPr>
           <a:xfrm>
             <a:off x="1143000" y="8915400"/>
-            <a:ext cx="2056680" cy="2285280"/>
+            <a:ext cx="2056320" cy="2284920"/>
           </a:xfrm>
           <a:prstGeom prst="flowChartAlternateProcess">
             <a:avLst/>
@@ -5431,14 +5431,14 @@
       </p:sp>
       <p:sp>
         <p:nvSpPr>
-          <p:cNvPr id="116" name=""/>
+          <p:cNvPr id="117" name=""/>
           <p:cNvSpPr/>
           <p:nvPr/>
         </p:nvSpPr>
         <p:spPr>
           <a:xfrm>
             <a:off x="3657600" y="7728840"/>
-            <a:ext cx="1599480" cy="1142280"/>
+            <a:ext cx="1599120" cy="1141920"/>
           </a:xfrm>
           <a:custGeom>
             <a:avLst/>
@@ -5490,14 +5490,14 @@
       </p:sp>
       <p:sp>
         <p:nvSpPr>
-          <p:cNvPr id="117" name=""/>
+          <p:cNvPr id="118" name=""/>
           <p:cNvSpPr/>
           <p:nvPr/>
         </p:nvSpPr>
         <p:spPr>
           <a:xfrm>
             <a:off x="18059400" y="7772400"/>
-            <a:ext cx="1599480" cy="1142280"/>
+            <a:ext cx="1599120" cy="1141920"/>
           </a:xfrm>
           <a:custGeom>
             <a:avLst/>
@@ -5549,14 +5549,14 @@
       </p:sp>
       <p:sp>
         <p:nvSpPr>
-          <p:cNvPr id="118" name=""/>
+          <p:cNvPr id="119" name=""/>
           <p:cNvSpPr/>
           <p:nvPr/>
         </p:nvSpPr>
         <p:spPr>
           <a:xfrm>
             <a:off x="20116800" y="6858000"/>
-            <a:ext cx="3656880" cy="2742480"/>
+            <a:ext cx="3656520" cy="2742120"/>
           </a:xfrm>
           <a:prstGeom prst="wedgeRoundRectCallout">
             <a:avLst>
@@ -5609,14 +5609,14 @@
       </p:sp>
       <p:sp>
         <p:nvSpPr>
-          <p:cNvPr id="119" name=""/>
+          <p:cNvPr id="120" name=""/>
           <p:cNvSpPr/>
           <p:nvPr/>
         </p:nvSpPr>
         <p:spPr>
           <a:xfrm>
             <a:off x="5735880" y="4007160"/>
-            <a:ext cx="11886480" cy="8565120"/>
+            <a:ext cx="11886120" cy="8564760"/>
           </a:xfrm>
           <a:prstGeom prst="flowChartAlternateProcess">
             <a:avLst/>
@@ -5638,7 +5638,7 @@
       </p:sp>
       <p:sp>
         <p:nvSpPr>
-          <p:cNvPr id="120" name=""/>
+          <p:cNvPr id="121" name=""/>
           <p:cNvSpPr/>
           <p:nvPr/>
         </p:nvSpPr>
@@ -5666,14 +5666,14 @@
       </p:sp>
       <p:sp>
         <p:nvSpPr>
-          <p:cNvPr id="121" name=""/>
+          <p:cNvPr id="122" name=""/>
           <p:cNvSpPr/>
           <p:nvPr/>
         </p:nvSpPr>
         <p:spPr>
           <a:xfrm>
             <a:off x="14630400" y="5029200"/>
-            <a:ext cx="2285280" cy="2285280"/>
+            <a:ext cx="2284920" cy="2284920"/>
           </a:xfrm>
           <a:prstGeom prst="flowChartAlternateProcess">
             <a:avLst/>
@@ -5722,14 +5722,14 @@
       </p:sp>
       <p:sp>
         <p:nvSpPr>
-          <p:cNvPr id="122" name=""/>
+          <p:cNvPr id="123" name=""/>
           <p:cNvSpPr/>
           <p:nvPr/>
         </p:nvSpPr>
         <p:spPr>
           <a:xfrm>
             <a:off x="14401800" y="9144000"/>
-            <a:ext cx="2285280" cy="2285280"/>
+            <a:ext cx="2284920" cy="2284920"/>
           </a:xfrm>
           <a:prstGeom prst="flowChartAlternateProcess">
             <a:avLst/>
@@ -5778,14 +5778,14 @@
       </p:sp>
       <p:sp>
         <p:nvSpPr>
-          <p:cNvPr id="123" name=""/>
+          <p:cNvPr id="124" name=""/>
           <p:cNvSpPr/>
           <p:nvPr/>
         </p:nvSpPr>
         <p:spPr>
           <a:xfrm>
             <a:off x="6858000" y="9236520"/>
-            <a:ext cx="5942880" cy="2285280"/>
+            <a:ext cx="5942520" cy="2284920"/>
           </a:xfrm>
           <a:prstGeom prst="flowChartAlternateProcess">
             <a:avLst/>
@@ -5860,14 +5860,14 @@
       </p:sp>
       <p:sp>
         <p:nvSpPr>
-          <p:cNvPr id="124" name=""/>
+          <p:cNvPr id="125" name=""/>
           <p:cNvSpPr/>
           <p:nvPr/>
         </p:nvSpPr>
         <p:spPr>
           <a:xfrm>
             <a:off x="12801600" y="9829800"/>
-            <a:ext cx="1599480" cy="1142280"/>
+            <a:ext cx="1599120" cy="1141920"/>
           </a:xfrm>
           <a:custGeom>
             <a:avLst/>
@@ -5919,14 +5919,14 @@
       </p:sp>
       <p:sp>
         <p:nvSpPr>
-          <p:cNvPr id="125" name=""/>
+          <p:cNvPr id="126" name=""/>
           <p:cNvSpPr/>
           <p:nvPr/>
         </p:nvSpPr>
         <p:spPr>
           <a:xfrm>
             <a:off x="6629400" y="5029200"/>
-            <a:ext cx="2513880" cy="2285280"/>
+            <a:ext cx="2513520" cy="2284920"/>
           </a:xfrm>
           <a:prstGeom prst="flowChartAlternateProcess">
             <a:avLst/>
@@ -5975,14 +5975,14 @@
       </p:sp>
       <p:sp>
         <p:nvSpPr>
-          <p:cNvPr id="126" name=""/>
+          <p:cNvPr id="127" name=""/>
           <p:cNvSpPr/>
           <p:nvPr/>
         </p:nvSpPr>
         <p:spPr>
           <a:xfrm>
             <a:off x="9144000" y="5715000"/>
-            <a:ext cx="1599480" cy="1142280"/>
+            <a:ext cx="1599120" cy="1141920"/>
           </a:xfrm>
           <a:custGeom>
             <a:avLst/>
@@ -6034,14 +6034,14 @@
       </p:sp>
       <p:sp>
         <p:nvSpPr>
-          <p:cNvPr id="127" name=""/>
+          <p:cNvPr id="128" name=""/>
           <p:cNvSpPr/>
           <p:nvPr/>
         </p:nvSpPr>
         <p:spPr>
           <a:xfrm>
             <a:off x="13030200" y="5715000"/>
-            <a:ext cx="1599480" cy="1142280"/>
+            <a:ext cx="1599120" cy="1141920"/>
           </a:xfrm>
           <a:custGeom>
             <a:avLst/>
@@ -6093,14 +6093,14 @@
       </p:sp>
       <p:sp>
         <p:nvSpPr>
-          <p:cNvPr id="128" name=""/>
+          <p:cNvPr id="129" name=""/>
           <p:cNvSpPr/>
           <p:nvPr/>
         </p:nvSpPr>
         <p:spPr>
           <a:xfrm>
             <a:off x="10744200" y="5029200"/>
-            <a:ext cx="2285280" cy="2285280"/>
+            <a:ext cx="2284920" cy="2284920"/>
           </a:xfrm>
           <a:prstGeom prst="flowChartAlternateProcess">
             <a:avLst/>
@@ -6161,7 +6161,7 @@
         <p:txBody>
           <a:bodyPr/>
           <a:p>
-            <a:fld id="{C2AA67B7-F989-4844-9C0C-2DDA222CBBE0}" type="slidenum">
+            <a:fld id="{62D1906A-CD12-4F98-B991-6E1F1DDF975F}" type="slidenum">
               <a:t>13</a:t>
             </a:fld>
           </a:p>
@@ -6199,14 +6199,14 @@
       </p:grpSpPr>
       <p:sp>
         <p:nvSpPr>
-          <p:cNvPr id="129" name="Title text slide 5"/>
+          <p:cNvPr id="130" name="Title text slide 5"/>
           <p:cNvSpPr/>
           <p:nvPr/>
         </p:nvSpPr>
         <p:spPr>
           <a:xfrm>
             <a:off x="2394720" y="2072880"/>
-            <a:ext cx="19549800" cy="1319760"/>
+            <a:ext cx="19549440" cy="1319760"/>
           </a:xfrm>
           <a:prstGeom prst="rect">
             <a:avLst/>
@@ -6254,14 +6254,14 @@
       </p:sp>
       <p:sp>
         <p:nvSpPr>
-          <p:cNvPr id="130" name="Lorem ipsum dolor sit amet, consectetur adipiscing elit, sed do eiusmod tempor incididunt ut labore et dolore magna aliqua. Ut enim ad minim veniam, quis nostrud exercitation ullamco laboris nisi ut aliquip ex ea commodo consequat. Duis aute irure dolor in reprehenderit in voluptate velit esse cillum dolore eu fugiat nulla pariatur. Excepteur sint occaecat cupidatat non proident, sunt in culpa qui officia deserunt mollit anim id est laborum.… 4"/>
+          <p:cNvPr id="131" name="Lorem ipsum dolor sit amet, consectetur adipiscing elit, sed do eiusmod tempor incididunt ut labore et dolore magna aliqua. Ut enim ad minim veniam, quis nostrud exercitation ullamco laboris nisi ut aliquip ex ea commodo consequat. Duis aute irure dolor in reprehenderit in voluptate velit esse cillum dolore eu fugiat nulla pariatur. Excepteur sint occaecat cupidatat non proident, sunt in culpa qui officia deserunt mollit anim id est laborum.… 4"/>
           <p:cNvSpPr/>
           <p:nvPr/>
         </p:nvSpPr>
         <p:spPr>
           <a:xfrm>
             <a:off x="1600200" y="4572000"/>
-            <a:ext cx="20801880" cy="6890760"/>
+            <a:ext cx="20801520" cy="6890760"/>
           </a:xfrm>
           <a:prstGeom prst="rect">
             <a:avLst/>
@@ -6526,7 +6526,7 @@
         <p:txBody>
           <a:bodyPr/>
           <a:p>
-            <a:fld id="{6272BECE-E499-42BC-A2A0-F04EB32C441B}" type="slidenum">
+            <a:fld id="{05B03322-8948-4882-9D66-E9A5A97D88E4}" type="slidenum">
               <a:t>14</a:t>
             </a:fld>
           </a:p>
@@ -6564,14 +6564,14 @@
       </p:grpSpPr>
       <p:sp>
         <p:nvSpPr>
-          <p:cNvPr id="131" name="Title text slide 20"/>
+          <p:cNvPr id="132" name="Title text slide 20"/>
           <p:cNvSpPr/>
           <p:nvPr/>
         </p:nvSpPr>
         <p:spPr>
           <a:xfrm>
             <a:off x="2394720" y="2072880"/>
-            <a:ext cx="19549800" cy="1319760"/>
+            <a:ext cx="19549440" cy="1319760"/>
           </a:xfrm>
           <a:prstGeom prst="rect">
             <a:avLst/>
@@ -6619,14 +6619,14 @@
       </p:sp>
       <p:sp>
         <p:nvSpPr>
-          <p:cNvPr id="132" name="Lorem ipsum dolor sit amet, consectetur adipiscing elit, sed do eiusmod tempor incididunt ut labore et dolore magna aliqua. Ut enim ad minim veniam, quis nostrud exercitation ullamco laboris nisi ut aliquip ex ea commodo consequat. Duis aute irure dolor in reprehenderit in voluptate velit esse cillum dolore eu fugiat nulla pariatur. Excepteur sint occaecat cupidatat non proident, sunt in culpa qui officia deserunt mollit anim id est laborum.… 1"/>
+          <p:cNvPr id="133" name="Lorem ipsum dolor sit amet, consectetur adipiscing elit, sed do eiusmod tempor incididunt ut labore et dolore magna aliqua. Ut enim ad minim veniam, quis nostrud exercitation ullamco laboris nisi ut aliquip ex ea commodo consequat. Duis aute irure dolor in reprehenderit in voluptate velit esse cillum dolore eu fugiat nulla pariatur. Excepteur sint occaecat cupidatat non proident, sunt in culpa qui officia deserunt mollit anim id est laborum.… 1"/>
           <p:cNvSpPr/>
           <p:nvPr/>
         </p:nvSpPr>
         <p:spPr>
           <a:xfrm>
             <a:off x="2451240" y="5003640"/>
-            <a:ext cx="19226160" cy="5978520"/>
+            <a:ext cx="19225800" cy="5978520"/>
           </a:xfrm>
           <a:prstGeom prst="rect">
             <a:avLst/>
@@ -6824,7 +6824,7 @@
         <p:txBody>
           <a:bodyPr/>
           <a:p>
-            <a:fld id="{B999D2CD-7CEC-42EE-B8FA-32E50E54DCF3}" type="slidenum">
+            <a:fld id="{EACC950D-73A1-496F-B112-B494385312B4}" type="slidenum">
               <a:t>15</a:t>
             </a:fld>
           </a:p>
@@ -6869,28 +6869,28 @@
       </p:grpSpPr>
       <p:grpSp>
         <p:nvGrpSpPr>
-          <p:cNvPr id="133" name="Группа 29"/>
+          <p:cNvPr id="134" name="Группа 29"/>
           <p:cNvGrpSpPr/>
           <p:nvPr/>
         </p:nvGrpSpPr>
         <p:grpSpPr>
           <a:xfrm>
             <a:off x="1296360" y="1017000"/>
-            <a:ext cx="11680560" cy="11680560"/>
+            <a:ext cx="11680200" cy="11680200"/>
             <a:chOff x="1296360" y="1017000"/>
-            <a:chExt cx="11680560" cy="11680560"/>
+            <a:chExt cx="11680200" cy="11680200"/>
           </a:xfrm>
         </p:grpSpPr>
         <p:sp>
           <p:nvSpPr>
-            <p:cNvPr id="134" name="Кружок 82"/>
+            <p:cNvPr id="135" name="Кружок 82"/>
             <p:cNvSpPr/>
             <p:nvPr/>
           </p:nvSpPr>
           <p:spPr>
             <a:xfrm>
               <a:off x="1296360" y="1017000"/>
-              <a:ext cx="11680560" cy="11680560"/>
+              <a:ext cx="11680200" cy="11680200"/>
             </a:xfrm>
             <a:prstGeom prst="ellipse">
               <a:avLst/>
@@ -6919,14 +6919,14 @@
         </p:sp>
         <p:sp>
           <p:nvSpPr>
-            <p:cNvPr id="135" name="Thank you! 1"/>
+            <p:cNvPr id="136" name="Thank you! 1"/>
             <p:cNvSpPr/>
             <p:nvPr/>
           </p:nvSpPr>
           <p:spPr>
             <a:xfrm>
               <a:off x="2514600" y="5029200"/>
-              <a:ext cx="9512280" cy="3757680"/>
+              <a:ext cx="9511920" cy="3757680"/>
             </a:xfrm>
             <a:prstGeom prst="rect">
               <a:avLst/>
@@ -6988,14 +6988,14 @@
       </p:grpSp>
       <p:sp>
         <p:nvSpPr>
-          <p:cNvPr id="136" name="Закругленный прямоугольник 52"/>
+          <p:cNvPr id="137" name="Закругленный прямоугольник 52"/>
           <p:cNvSpPr/>
           <p:nvPr/>
         </p:nvSpPr>
         <p:spPr>
           <a:xfrm>
             <a:off x="14731920" y="1015920"/>
-            <a:ext cx="18114120" cy="11682720"/>
+            <a:ext cx="18113760" cy="11682360"/>
           </a:xfrm>
           <a:prstGeom prst="roundRect">
             <a:avLst>
@@ -7018,14 +7018,14 @@
       </p:sp>
       <p:sp>
         <p:nvSpPr>
-          <p:cNvPr id="137" name="Кружок 83"/>
+          <p:cNvPr id="138" name="Кружок 83"/>
           <p:cNvSpPr/>
           <p:nvPr/>
         </p:nvSpPr>
         <p:spPr>
           <a:xfrm>
             <a:off x="15976440" y="10906200"/>
-            <a:ext cx="1030320" cy="1030320"/>
+            <a:ext cx="1029960" cy="1029960"/>
           </a:xfrm>
           <a:prstGeom prst="ellipse">
             <a:avLst/>
@@ -7046,14 +7046,14 @@
       </p:sp>
       <p:sp>
         <p:nvSpPr>
-          <p:cNvPr id="138" name="Кружок 84"/>
+          <p:cNvPr id="139" name="Кружок 84"/>
           <p:cNvSpPr/>
           <p:nvPr/>
         </p:nvSpPr>
         <p:spPr>
           <a:xfrm>
             <a:off x="17276760" y="10906200"/>
-            <a:ext cx="1030320" cy="1030320"/>
+            <a:ext cx="1029960" cy="1029960"/>
           </a:xfrm>
           <a:prstGeom prst="ellipse">
             <a:avLst/>
@@ -7074,14 +7074,14 @@
       </p:sp>
       <p:sp>
         <p:nvSpPr>
-          <p:cNvPr id="139" name="Кружок 85"/>
+          <p:cNvPr id="140" name="Кружок 85"/>
           <p:cNvSpPr/>
           <p:nvPr/>
         </p:nvSpPr>
         <p:spPr>
           <a:xfrm>
             <a:off x="18576720" y="10906200"/>
-            <a:ext cx="1030320" cy="1030320"/>
+            <a:ext cx="1029960" cy="1029960"/>
           </a:xfrm>
           <a:prstGeom prst="ellipse">
             <a:avLst/>
@@ -7102,14 +7102,14 @@
       </p:sp>
       <p:sp>
         <p:nvSpPr>
-          <p:cNvPr id="140" name="Кружок 86"/>
+          <p:cNvPr id="141" name="Кружок 86"/>
           <p:cNvSpPr/>
           <p:nvPr/>
         </p:nvSpPr>
         <p:spPr>
           <a:xfrm>
             <a:off x="19877040" y="10906200"/>
-            <a:ext cx="1030320" cy="1030320"/>
+            <a:ext cx="1029960" cy="1029960"/>
           </a:xfrm>
           <a:prstGeom prst="ellipse">
             <a:avLst/>
@@ -7130,14 +7130,14 @@
       </p:sp>
       <p:sp>
         <p:nvSpPr>
-          <p:cNvPr id="141" name="Кружок 87"/>
+          <p:cNvPr id="142" name="Кружок 87"/>
           <p:cNvSpPr/>
           <p:nvPr/>
         </p:nvSpPr>
         <p:spPr>
           <a:xfrm>
             <a:off x="21177000" y="10906200"/>
-            <a:ext cx="1030320" cy="1030320"/>
+            <a:ext cx="1029960" cy="1029960"/>
           </a:xfrm>
           <a:prstGeom prst="ellipse">
             <a:avLst/>
@@ -7158,14 +7158,14 @@
       </p:sp>
       <p:sp>
         <p:nvSpPr>
-          <p:cNvPr id="142" name="Кружок 88"/>
+          <p:cNvPr id="143" name="Кружок 88"/>
           <p:cNvSpPr/>
           <p:nvPr/>
         </p:nvSpPr>
         <p:spPr>
           <a:xfrm>
             <a:off x="22477320" y="10906200"/>
-            <a:ext cx="1030320" cy="1030320"/>
+            <a:ext cx="1029960" cy="1029960"/>
           </a:xfrm>
           <a:prstGeom prst="ellipse">
             <a:avLst/>
@@ -7186,14 +7186,14 @@
       </p:sp>
       <p:sp>
         <p:nvSpPr>
-          <p:cNvPr id="143" name="Кружок 89"/>
+          <p:cNvPr id="144" name="Кружок 89"/>
           <p:cNvSpPr/>
           <p:nvPr/>
         </p:nvSpPr>
         <p:spPr>
           <a:xfrm>
             <a:off x="23777280" y="10906200"/>
-            <a:ext cx="1030320" cy="1030320"/>
+            <a:ext cx="1029960" cy="1029960"/>
           </a:xfrm>
           <a:prstGeom prst="ellipse">
             <a:avLst/>
@@ -7226,7 +7226,7 @@
         <p:txBody>
           <a:bodyPr/>
           <a:p>
-            <a:fld id="{EC2971AA-0231-4E62-9A20-B7CE0BA16148}" type="slidenum">
+            <a:fld id="{DA6BFA7C-6023-44F7-96A5-DCF89043E8D1}" type="slidenum">
               <a:t>16</a:t>
             </a:fld>
           </a:p>
@@ -7271,7 +7271,7 @@
         <p:spPr>
           <a:xfrm>
             <a:off x="2394720" y="2072880"/>
-            <a:ext cx="9110880" cy="1319760"/>
+            <a:ext cx="9110520" cy="1319760"/>
           </a:xfrm>
           <a:prstGeom prst="rect">
             <a:avLst/>
@@ -7326,7 +7326,7 @@
         <p:spPr>
           <a:xfrm>
             <a:off x="2451240" y="5003640"/>
-            <a:ext cx="19265040" cy="5724360"/>
+            <a:ext cx="19264680" cy="7548840"/>
           </a:xfrm>
           <a:prstGeom prst="rect">
             <a:avLst/>
@@ -7482,6 +7482,40 @@
                 <a:tab algn="l" pos="0"/>
               </a:tabLst>
             </a:pPr>
+            <a:endParaRPr b="0" lang="en-US" sz="3600" spc="-1" strike="noStrike">
+              <a:latin typeface="Arial"/>
+            </a:endParaRPr>
+          </a:p>
+          <a:p>
+            <a:pPr>
+              <a:lnSpc>
+                <a:spcPct val="120000"/>
+              </a:lnSpc>
+              <a:spcBef>
+                <a:spcPts val="2001"/>
+              </a:spcBef>
+              <a:buNone/>
+              <a:tabLst>
+                <a:tab algn="l" pos="0"/>
+              </a:tabLst>
+            </a:pPr>
+            <a:endParaRPr b="0" lang="en-US" sz="3600" spc="-1" strike="noStrike">
+              <a:latin typeface="Arial"/>
+            </a:endParaRPr>
+          </a:p>
+          <a:p>
+            <a:pPr>
+              <a:lnSpc>
+                <a:spcPct val="120000"/>
+              </a:lnSpc>
+              <a:spcBef>
+                <a:spcPts val="2001"/>
+              </a:spcBef>
+              <a:buNone/>
+              <a:tabLst>
+                <a:tab algn="l" pos="0"/>
+              </a:tabLst>
+            </a:pPr>
             <a:r>
               <a:rPr b="0" lang="ru-RU" sz="3600" spc="-1" strike="noStrike">
                 <a:solidFill>
@@ -7520,6 +7554,29 @@
           </a:p>
         </p:txBody>
       </p:sp>
+      <p:pic>
+        <p:nvPicPr>
+          <p:cNvPr id="84" name="" descr=""/>
+          <p:cNvPicPr/>
+          <p:nvPr/>
+        </p:nvPicPr>
+        <p:blipFill>
+          <a:blip r:embed="rId3"/>
+          <a:stretch/>
+        </p:blipFill>
+        <p:spPr>
+          <a:xfrm>
+            <a:off x="14630400" y="6400800"/>
+            <a:ext cx="5035680" cy="5035680"/>
+          </a:xfrm>
+          <a:prstGeom prst="rect">
+            <a:avLst/>
+          </a:prstGeom>
+          <a:ln w="0">
+            <a:noFill/>
+          </a:ln>
+        </p:spPr>
+      </p:pic>
       <p:sp>
         <p:nvSpPr>
           <p:cNvPr id="2" name="PlaceHolder 1"/>
@@ -7534,7 +7591,7 @@
         <p:txBody>
           <a:bodyPr/>
           <a:p>
-            <a:fld id="{D97B4D29-3242-47D5-BE41-AC400C1D966C}" type="slidenum">
+            <a:fld id="{48DF3BDC-1708-4EAF-929F-F92487345047}" type="slidenum">
               <a:t>2</a:t>
             </a:fld>
           </a:p>
@@ -7572,14 +7629,14 @@
       </p:grpSpPr>
       <p:sp>
         <p:nvSpPr>
-          <p:cNvPr id="84" name="Закругленный прямоугольник"/>
+          <p:cNvPr id="85" name="Закругленный прямоугольник"/>
           <p:cNvSpPr/>
           <p:nvPr/>
         </p:nvSpPr>
         <p:spPr>
           <a:xfrm>
             <a:off x="9077400" y="2438280"/>
-            <a:ext cx="6228000" cy="8837640"/>
+            <a:ext cx="6227640" cy="8837280"/>
           </a:xfrm>
           <a:prstGeom prst="roundRect">
             <a:avLst>
@@ -7602,14 +7659,14 @@
       </p:sp>
       <p:sp>
         <p:nvSpPr>
-          <p:cNvPr id="85" name="Закругленный прямоугольник"/>
+          <p:cNvPr id="86" name="Закругленный прямоугольник"/>
           <p:cNvSpPr/>
           <p:nvPr/>
         </p:nvSpPr>
         <p:spPr>
           <a:xfrm>
             <a:off x="16230600" y="3886200"/>
-            <a:ext cx="6228000" cy="8837640"/>
+            <a:ext cx="6227640" cy="8837280"/>
           </a:xfrm>
           <a:prstGeom prst="roundRect">
             <a:avLst>
@@ -7632,14 +7689,14 @@
       </p:sp>
       <p:sp>
         <p:nvSpPr>
-          <p:cNvPr id="86" name="Alice Stark"/>
+          <p:cNvPr id="87" name="Alice Stark"/>
           <p:cNvSpPr/>
           <p:nvPr/>
         </p:nvSpPr>
         <p:spPr>
           <a:xfrm>
-            <a:off x="914400" y="10413360"/>
-            <a:ext cx="6629400" cy="1931040"/>
+            <a:off x="914400" y="10414080"/>
+            <a:ext cx="6629040" cy="1929600"/>
           </a:xfrm>
           <a:prstGeom prst="rect">
             <a:avLst/>
@@ -7700,14 +7757,14 @@
       </p:sp>
       <p:sp>
         <p:nvSpPr>
-          <p:cNvPr id="87" name="Alex Lee"/>
+          <p:cNvPr id="88" name="Alex Lee"/>
           <p:cNvSpPr/>
           <p:nvPr/>
         </p:nvSpPr>
         <p:spPr>
           <a:xfrm>
-            <a:off x="8458200" y="10415160"/>
-            <a:ext cx="6400800" cy="1931040"/>
+            <a:off x="8458200" y="10415880"/>
+            <a:ext cx="6400440" cy="1929600"/>
           </a:xfrm>
           <a:prstGeom prst="rect">
             <a:avLst/>
@@ -7768,14 +7825,14 @@
       </p:sp>
       <p:sp>
         <p:nvSpPr>
-          <p:cNvPr id="88" name="Andy Fry"/>
+          <p:cNvPr id="89" name="Andy Fry"/>
           <p:cNvSpPr/>
           <p:nvPr/>
         </p:nvSpPr>
         <p:spPr>
           <a:xfrm>
             <a:off x="16504560" y="10400400"/>
-            <a:ext cx="7225920" cy="2844000"/>
+            <a:ext cx="7225560" cy="2844000"/>
           </a:xfrm>
           <a:prstGeom prst="rect">
             <a:avLst/>
@@ -7839,23 +7896,29 @@
       </p:sp>
       <p:sp>
         <p:nvSpPr>
-          <p:cNvPr id="89" name="PlaceHolder 3"/>
-          <p:cNvSpPr txBox="1"/>
+          <p:cNvPr id="90" name="PlaceHolder 3"/>
+          <p:cNvSpPr/>
           <p:nvPr/>
         </p:nvSpPr>
         <p:spPr>
           <a:xfrm>
             <a:off x="1219320" y="547200"/>
-            <a:ext cx="21943800" cy="2288880"/>
-          </a:xfrm>
-          <a:prstGeom prst="rect">
-            <a:avLst/>
-          </a:prstGeom>
-          <a:noFill/>
-          <a:ln w="0">
-            <a:noFill/>
-          </a:ln>
-        </p:spPr>
+            <a:ext cx="21943440" cy="2288520"/>
+          </a:xfrm>
+          <a:prstGeom prst="rect">
+            <a:avLst/>
+          </a:prstGeom>
+          <a:noFill/>
+          <a:ln w="0">
+            <a:noFill/>
+          </a:ln>
+        </p:spPr>
+        <p:style>
+          <a:lnRef idx="0"/>
+          <a:fillRef idx="0"/>
+          <a:effectRef idx="0"/>
+          <a:fontRef idx="minor"/>
+        </p:style>
         <p:txBody>
           <a:bodyPr lIns="0" rIns="0" tIns="0" bIns="0" anchor="ctr">
             <a:noAutofit/>
@@ -7888,7 +7951,7 @@
       </p:sp>
       <p:pic>
         <p:nvPicPr>
-          <p:cNvPr id="90" name="" descr=""/>
+          <p:cNvPr id="91" name="" descr=""/>
           <p:cNvPicPr/>
           <p:nvPr/>
         </p:nvPicPr>
@@ -7899,30 +7962,7 @@
         <p:spPr>
           <a:xfrm>
             <a:off x="914400" y="2836080"/>
-            <a:ext cx="6383520" cy="7222320"/>
-          </a:xfrm>
-          <a:prstGeom prst="rect">
-            <a:avLst/>
-          </a:prstGeom>
-          <a:ln w="0">
-            <a:noFill/>
-          </a:ln>
-        </p:spPr>
-      </p:pic>
-      <p:pic>
-        <p:nvPicPr>
-          <p:cNvPr id="91" name="" descr=""/>
-          <p:cNvPicPr/>
-          <p:nvPr/>
-        </p:nvPicPr>
-        <p:blipFill>
-          <a:blip r:embed="rId2"/>
-          <a:stretch/>
-        </p:blipFill>
-        <p:spPr>
-          <a:xfrm>
-            <a:off x="8372880" y="2836080"/>
-            <a:ext cx="7171920" cy="7222320"/>
+            <a:ext cx="6383160" cy="7221960"/>
           </a:xfrm>
           <a:prstGeom prst="rect">
             <a:avLst/>
@@ -7939,13 +7979,36 @@
           <p:nvPr/>
         </p:nvPicPr>
         <p:blipFill>
+          <a:blip r:embed="rId2"/>
+          <a:stretch/>
+        </p:blipFill>
+        <p:spPr>
+          <a:xfrm>
+            <a:off x="8372880" y="2836080"/>
+            <a:ext cx="7171560" cy="7221960"/>
+          </a:xfrm>
+          <a:prstGeom prst="rect">
+            <a:avLst/>
+          </a:prstGeom>
+          <a:ln w="0">
+            <a:noFill/>
+          </a:ln>
+        </p:spPr>
+      </p:pic>
+      <p:pic>
+        <p:nvPicPr>
+          <p:cNvPr id="93" name="" descr=""/>
+          <p:cNvPicPr/>
+          <p:nvPr/>
+        </p:nvPicPr>
+        <p:blipFill>
           <a:blip r:embed="rId3"/>
           <a:stretch/>
         </p:blipFill>
         <p:spPr>
           <a:xfrm>
             <a:off x="16277040" y="2836080"/>
-            <a:ext cx="7268760" cy="7222320"/>
+            <a:ext cx="7268400" cy="7221960"/>
           </a:xfrm>
           <a:prstGeom prst="rect">
             <a:avLst/>
@@ -7969,7 +8032,7 @@
         <p:txBody>
           <a:bodyPr/>
           <a:p>
-            <a:fld id="{94B76945-1E17-4786-B30F-F0F4E9BD608C}" type="slidenum">
+            <a:fld id="{D1568859-8C77-40C2-BB94-9D6081081072}" type="slidenum">
               <a:t>3</a:t>
             </a:fld>
           </a:p>
@@ -8007,14 +8070,14 @@
       </p:grpSpPr>
       <p:sp>
         <p:nvSpPr>
-          <p:cNvPr id="93" name="Title text slide"/>
+          <p:cNvPr id="94" name="Title text slide"/>
           <p:cNvSpPr/>
           <p:nvPr/>
         </p:nvSpPr>
         <p:spPr>
           <a:xfrm>
             <a:off x="2394720" y="966240"/>
-            <a:ext cx="18635400" cy="1319760"/>
+            <a:ext cx="18635040" cy="1319760"/>
           </a:xfrm>
           <a:prstGeom prst="rect">
             <a:avLst/>
@@ -8062,7 +8125,7 @@
       </p:sp>
       <p:pic>
         <p:nvPicPr>
-          <p:cNvPr id="94" name="" descr=""/>
+          <p:cNvPr id="95" name="" descr=""/>
           <p:cNvPicPr/>
           <p:nvPr/>
         </p:nvPicPr>
@@ -8073,7 +8136,7 @@
         <p:spPr>
           <a:xfrm>
             <a:off x="952200" y="2891160"/>
-            <a:ext cx="4762440" cy="4762440"/>
+            <a:ext cx="4762080" cy="4762080"/>
           </a:xfrm>
           <a:prstGeom prst="rect">
             <a:avLst/>
@@ -8085,14 +8148,14 @@
       </p:pic>
       <p:sp>
         <p:nvSpPr>
-          <p:cNvPr id="95" name=""/>
+          <p:cNvPr id="96" name=""/>
           <p:cNvSpPr/>
           <p:nvPr/>
         </p:nvSpPr>
         <p:spPr>
           <a:xfrm>
             <a:off x="914400" y="8148960"/>
-            <a:ext cx="5028840" cy="2137680"/>
+            <a:ext cx="5028480" cy="2137320"/>
           </a:xfrm>
           <a:prstGeom prst="rect">
             <a:avLst/>
@@ -8121,7 +8184,11 @@
             </a:pPr>
             <a:r>
               <a:rPr b="0" lang="en-US" sz="3600" spc="-1" strike="noStrike">
+                <a:solidFill>
+                  <a:srgbClr val="000000"/>
+                </a:solidFill>
                 <a:latin typeface="Arial"/>
+                <a:ea typeface="DejaVu Sans"/>
               </a:rPr>
               <a:t>Coach Nick</a:t>
             </a:r>
@@ -8143,7 +8210,11 @@
             </a:pPr>
             <a:r>
               <a:rPr b="0" lang="en-US" sz="3600" spc="-1" strike="noStrike">
+                <a:solidFill>
+                  <a:srgbClr val="000000"/>
+                </a:solidFill>
                 <a:latin typeface="Arial"/>
+                <a:ea typeface="DejaVu Sans"/>
               </a:rPr>
               <a:t>Nick Hauselman</a:t>
             </a:r>
@@ -8164,15 +8235,24 @@
               <a:buChar char=""/>
             </a:pPr>
             <a:r>
+              <a:rPr b="0" lang="en-US" sz="3600" spc="-1" strike="noStrike" u="sng">
+                <a:solidFill>
+                  <a:srgbClr val="635ed5"/>
+                </a:solidFill>
+                <a:uFillTx/>
+                <a:latin typeface="Arial"/>
+                <a:ea typeface="DejaVu Sans"/>
+                <a:hlinkClick r:id="rId2"/>
+              </a:rPr>
+              <a:t>твиттер</a:t>
+            </a:r>
+            <a:r>
               <a:rPr b="0" lang="en-US" sz="3600" spc="-1" strike="noStrike">
+                <a:solidFill>
+                  <a:srgbClr val="000000"/>
+                </a:solidFill>
                 <a:latin typeface="Arial"/>
-                <a:hlinkClick r:id="rId2"/>
-              </a:rPr>
-              <a:t>твиттер</a:t>
-            </a:r>
-            <a:r>
-              <a:rPr b="0" lang="en-US" sz="3600" spc="-1" strike="noStrike">
-                <a:latin typeface="Arial"/>
+                <a:ea typeface="DejaVu Sans"/>
               </a:rPr>
               <a:t>: 144.5K </a:t>
             </a:r>
@@ -8193,15 +8273,24 @@
               <a:buChar char=""/>
             </a:pPr>
             <a:r>
+              <a:rPr b="0" lang="en-US" sz="3600" spc="-1" strike="noStrike" u="sng">
+                <a:solidFill>
+                  <a:srgbClr val="635ed5"/>
+                </a:solidFill>
+                <a:uFillTx/>
+                <a:latin typeface="Arial"/>
+                <a:ea typeface="DejaVu Sans"/>
+                <a:hlinkClick r:id="rId3"/>
+              </a:rPr>
+              <a:t>ютуб</a:t>
+            </a:r>
+            <a:r>
               <a:rPr b="0" lang="en-US" sz="3600" spc="-1" strike="noStrike">
+                <a:solidFill>
+                  <a:srgbClr val="000000"/>
+                </a:solidFill>
                 <a:latin typeface="Arial"/>
-                <a:hlinkClick r:id="rId3"/>
-              </a:rPr>
-              <a:t>ютуб</a:t>
-            </a:r>
-            <a:r>
-              <a:rPr b="0" lang="en-US" sz="3600" spc="-1" strike="noStrike">
-                <a:latin typeface="Arial"/>
+                <a:ea typeface="DejaVu Sans"/>
               </a:rPr>
               <a:t>: 866K</a:t>
             </a:r>
@@ -8213,7 +8302,7 @@
       </p:sp>
       <p:pic>
         <p:nvPicPr>
-          <p:cNvPr id="96" name="" descr=""/>
+          <p:cNvPr id="97" name="" descr=""/>
           <p:cNvPicPr/>
           <p:nvPr/>
         </p:nvPicPr>
@@ -8224,7 +8313,7 @@
         <p:spPr>
           <a:xfrm>
             <a:off x="6400800" y="2743200"/>
-            <a:ext cx="16916040" cy="10388160"/>
+            <a:ext cx="16915680" cy="10387800"/>
           </a:xfrm>
           <a:prstGeom prst="rect">
             <a:avLst/>
@@ -8248,7 +8337,7 @@
         <p:txBody>
           <a:bodyPr/>
           <a:p>
-            <a:fld id="{A9D7623D-E5E2-41A7-8A5B-F3D2D9843E65}" type="slidenum">
+            <a:fld id="{62982101-783D-4F1E-9640-3CFBE435E8DA}" type="slidenum">
               <a:t>4</a:t>
             </a:fld>
           </a:p>
@@ -8286,7 +8375,7 @@
       </p:grpSpPr>
       <p:sp>
         <p:nvSpPr>
-          <p:cNvPr id="97" name="PlaceHolder 1"/>
+          <p:cNvPr id="98" name="PlaceHolder 1"/>
           <p:cNvSpPr>
             <a:spLocks noGrp="1"/>
           </p:cNvSpPr>
@@ -8297,7 +8386,7 @@
         <p:spPr>
           <a:xfrm>
             <a:off x="1218960" y="547200"/>
-            <a:ext cx="21943800" cy="2288880"/>
+            <a:ext cx="21943440" cy="2288520"/>
           </a:xfrm>
           <a:prstGeom prst="rect">
             <a:avLst/>
@@ -8339,7 +8428,7 @@
       </p:sp>
       <p:sp>
         <p:nvSpPr>
-          <p:cNvPr id="98" name="PlaceHolder 2"/>
+          <p:cNvPr id="99" name="PlaceHolder 2"/>
           <p:cNvSpPr>
             <a:spLocks noGrp="1"/>
           </p:cNvSpPr>
@@ -8350,7 +8439,7 @@
         <p:spPr>
           <a:xfrm>
             <a:off x="915120" y="3200400"/>
-            <a:ext cx="21943800" cy="8914680"/>
+            <a:ext cx="21943440" cy="8914320"/>
           </a:xfrm>
           <a:prstGeom prst="rect">
             <a:avLst/>
@@ -8707,7 +8796,7 @@
         <p:txBody>
           <a:bodyPr/>
           <a:p>
-            <a:fld id="{868B9417-9C5B-4188-8602-29875DFD83B2}" type="slidenum">
+            <a:fld id="{6A018D97-965A-4855-8EF0-2CAFED51B3F6}" type="slidenum">
               <a:t>5</a:t>
             </a:fld>
           </a:p>
@@ -8745,14 +8834,14 @@
       </p:grpSpPr>
       <p:sp>
         <p:nvSpPr>
-          <p:cNvPr id="99" name="Title text slide 2"/>
+          <p:cNvPr id="100" name="Title text slide 2"/>
           <p:cNvSpPr/>
           <p:nvPr/>
         </p:nvSpPr>
         <p:spPr>
           <a:xfrm>
             <a:off x="2394720" y="2072880"/>
-            <a:ext cx="19549800" cy="1319760"/>
+            <a:ext cx="19549440" cy="1319760"/>
           </a:xfrm>
           <a:prstGeom prst="rect">
             <a:avLst/>
@@ -8800,14 +8889,14 @@
       </p:sp>
       <p:sp>
         <p:nvSpPr>
-          <p:cNvPr id="100" name="Lorem ipsum dolor sit amet, consectetur adipiscing elit, sed do eiusmod tempor incididunt ut labore et dolore magna aliqua. Ut enim ad minim veniam, quis nostrud exercitation ullamco laboris nisi ut aliquip ex ea commodo consequat. Duis aute irure dolor in reprehenderit in voluptate velit esse cillum dolore eu fugiat nulla pariatur. Excepteur sint occaecat cupidatat non proident, sunt in culpa qui officia deserunt mollit anim id est laborum.… 2"/>
+          <p:cNvPr id="101" name="Lorem ipsum dolor sit amet, consectetur adipiscing elit, sed do eiusmod tempor incididunt ut labore et dolore magna aliqua. Ut enim ad minim veniam, quis nostrud exercitation ullamco laboris nisi ut aliquip ex ea commodo consequat. Duis aute irure dolor in reprehenderit in voluptate velit esse cillum dolore eu fugiat nulla pariatur. Excepteur sint occaecat cupidatat non proident, sunt in culpa qui officia deserunt mollit anim id est laborum.… 2"/>
           <p:cNvSpPr/>
           <p:nvPr/>
         </p:nvSpPr>
         <p:spPr>
           <a:xfrm>
             <a:off x="2360520" y="4663440"/>
-            <a:ext cx="19226160" cy="6637320"/>
+            <a:ext cx="19225800" cy="6636600"/>
           </a:xfrm>
           <a:prstGeom prst="rect">
             <a:avLst/>
@@ -9005,7 +9094,7 @@
         <p:txBody>
           <a:bodyPr/>
           <a:p>
-            <a:fld id="{BA51600E-E93F-4F3B-80FD-06CFC9973E7C}" type="slidenum">
+            <a:fld id="{D48BC8A3-EE32-4F91-8050-D6E6D4D921F4}" type="slidenum">
               <a:t>6</a:t>
             </a:fld>
           </a:p>
@@ -9043,14 +9132,14 @@
       </p:grpSpPr>
       <p:sp>
         <p:nvSpPr>
-          <p:cNvPr id="101" name="Title text slide 1"/>
+          <p:cNvPr id="102" name="Title text slide 1"/>
           <p:cNvSpPr/>
           <p:nvPr/>
         </p:nvSpPr>
         <p:spPr>
           <a:xfrm>
-            <a:off x="2394720" y="2072160"/>
-            <a:ext cx="19549800" cy="1321200"/>
+            <a:off x="2394720" y="2072880"/>
+            <a:ext cx="19549440" cy="1319760"/>
           </a:xfrm>
           <a:prstGeom prst="rect">
             <a:avLst/>
@@ -9098,7 +9187,7 @@
       </p:sp>
       <p:pic>
         <p:nvPicPr>
-          <p:cNvPr id="102" name="" descr=""/>
+          <p:cNvPr id="103" name="" descr=""/>
           <p:cNvPicPr/>
           <p:nvPr/>
         </p:nvPicPr>
@@ -9109,7 +9198,7 @@
         <p:spPr>
           <a:xfrm>
             <a:off x="1904760" y="4343400"/>
-            <a:ext cx="20574000" cy="5042880"/>
+            <a:ext cx="20573640" cy="5042520"/>
           </a:xfrm>
           <a:prstGeom prst="rect">
             <a:avLst/>
@@ -9133,7 +9222,7 @@
         <p:txBody>
           <a:bodyPr/>
           <a:p>
-            <a:fld id="{696A055B-1B36-4EFC-90F8-9F5F1CC7F879}" type="slidenum">
+            <a:fld id="{CC1E05FE-DFA7-4356-9E5A-A47B02A873ED}" type="slidenum">
               <a:t>7</a:t>
             </a:fld>
           </a:p>
@@ -9171,14 +9260,14 @@
       </p:grpSpPr>
       <p:sp>
         <p:nvSpPr>
-          <p:cNvPr id="103" name="Title text slide 6"/>
+          <p:cNvPr id="104" name="Title text slide 6"/>
           <p:cNvSpPr/>
           <p:nvPr/>
         </p:nvSpPr>
         <p:spPr>
           <a:xfrm>
-            <a:off x="2394720" y="2072160"/>
-            <a:ext cx="19549800" cy="1321200"/>
+            <a:off x="2394720" y="2072880"/>
+            <a:ext cx="19549440" cy="1319760"/>
           </a:xfrm>
           <a:prstGeom prst="rect">
             <a:avLst/>
@@ -9216,307 +9305,7 @@
                 <a:latin typeface="Maven Pro Medium"/>
                 <a:ea typeface="Maven Pro Medium"/>
               </a:rPr>
-              <a:t>О</a:t>
-            </a:r>
-            <a:r>
-              <a:rPr b="0" lang="en-US" sz="8000" spc="-1" strike="noStrike">
-                <a:solidFill>
-                  <a:srgbClr val="ffffff"/>
-                </a:solidFill>
-                <a:latin typeface="Maven Pro Medium"/>
-                <a:ea typeface="Maven Pro Medium"/>
-              </a:rPr>
-              <a:t>с</a:t>
-            </a:r>
-            <a:r>
-              <a:rPr b="0" lang="en-US" sz="8000" spc="-1" strike="noStrike">
-                <a:solidFill>
-                  <a:srgbClr val="ffffff"/>
-                </a:solidFill>
-                <a:latin typeface="Maven Pro Medium"/>
-                <a:ea typeface="Maven Pro Medium"/>
-              </a:rPr>
-              <a:t>н</a:t>
-            </a:r>
-            <a:r>
-              <a:rPr b="0" lang="en-US" sz="8000" spc="-1" strike="noStrike">
-                <a:solidFill>
-                  <a:srgbClr val="ffffff"/>
-                </a:solidFill>
-                <a:latin typeface="Maven Pro Medium"/>
-                <a:ea typeface="Maven Pro Medium"/>
-              </a:rPr>
-              <a:t>о</a:t>
-            </a:r>
-            <a:r>
-              <a:rPr b="0" lang="en-US" sz="8000" spc="-1" strike="noStrike">
-                <a:solidFill>
-                  <a:srgbClr val="ffffff"/>
-                </a:solidFill>
-                <a:latin typeface="Maven Pro Medium"/>
-                <a:ea typeface="Maven Pro Medium"/>
-              </a:rPr>
-              <a:t>в</a:t>
-            </a:r>
-            <a:r>
-              <a:rPr b="0" lang="en-US" sz="8000" spc="-1" strike="noStrike">
-                <a:solidFill>
-                  <a:srgbClr val="ffffff"/>
-                </a:solidFill>
-                <a:latin typeface="Maven Pro Medium"/>
-                <a:ea typeface="Maven Pro Medium"/>
-              </a:rPr>
-              <a:t>н</a:t>
-            </a:r>
-            <a:r>
-              <a:rPr b="0" lang="en-US" sz="8000" spc="-1" strike="noStrike">
-                <a:solidFill>
-                  <a:srgbClr val="ffffff"/>
-                </a:solidFill>
-                <a:latin typeface="Maven Pro Medium"/>
-                <a:ea typeface="Maven Pro Medium"/>
-              </a:rPr>
-              <a:t>о</a:t>
-            </a:r>
-            <a:r>
-              <a:rPr b="0" lang="en-US" sz="8000" spc="-1" strike="noStrike">
-                <a:solidFill>
-                  <a:srgbClr val="ffffff"/>
-                </a:solidFill>
-                <a:latin typeface="Maven Pro Medium"/>
-                <a:ea typeface="Maven Pro Medium"/>
-              </a:rPr>
-              <a:t>й</a:t>
-            </a:r>
-            <a:r>
-              <a:rPr b="0" lang="en-US" sz="8000" spc="-1" strike="noStrike">
-                <a:solidFill>
-                  <a:srgbClr val="ffffff"/>
-                </a:solidFill>
-                <a:latin typeface="Maven Pro Medium"/>
-                <a:ea typeface="Maven Pro Medium"/>
-              </a:rPr>
-              <a:t> </a:t>
-            </a:r>
-            <a:r>
-              <a:rPr b="0" lang="en-US" sz="8000" spc="-1" strike="noStrike">
-                <a:solidFill>
-                  <a:srgbClr val="ffffff"/>
-                </a:solidFill>
-                <a:latin typeface="Maven Pro Medium"/>
-                <a:ea typeface="Maven Pro Medium"/>
-              </a:rPr>
-              <a:t>с</a:t>
-            </a:r>
-            <a:r>
-              <a:rPr b="0" lang="en-US" sz="8000" spc="-1" strike="noStrike">
-                <a:solidFill>
-                  <a:srgbClr val="ffffff"/>
-                </a:solidFill>
-                <a:latin typeface="Maven Pro Medium"/>
-                <a:ea typeface="Maven Pro Medium"/>
-              </a:rPr>
-              <a:t>ц</a:t>
-            </a:r>
-            <a:r>
-              <a:rPr b="0" lang="en-US" sz="8000" spc="-1" strike="noStrike">
-                <a:solidFill>
-                  <a:srgbClr val="ffffff"/>
-                </a:solidFill>
-                <a:latin typeface="Maven Pro Medium"/>
-                <a:ea typeface="Maven Pro Medium"/>
-              </a:rPr>
-              <a:t>е</a:t>
-            </a:r>
-            <a:r>
-              <a:rPr b="0" lang="en-US" sz="8000" spc="-1" strike="noStrike">
-                <a:solidFill>
-                  <a:srgbClr val="ffffff"/>
-                </a:solidFill>
-                <a:latin typeface="Maven Pro Medium"/>
-                <a:ea typeface="Maven Pro Medium"/>
-              </a:rPr>
-              <a:t>н</a:t>
-            </a:r>
-            <a:r>
-              <a:rPr b="0" lang="en-US" sz="8000" spc="-1" strike="noStrike">
-                <a:solidFill>
-                  <a:srgbClr val="ffffff"/>
-                </a:solidFill>
-                <a:latin typeface="Maven Pro Medium"/>
-                <a:ea typeface="Maven Pro Medium"/>
-              </a:rPr>
-              <a:t>а</a:t>
-            </a:r>
-            <a:r>
-              <a:rPr b="0" lang="en-US" sz="8000" spc="-1" strike="noStrike">
-                <a:solidFill>
-                  <a:srgbClr val="ffffff"/>
-                </a:solidFill>
-                <a:latin typeface="Maven Pro Medium"/>
-                <a:ea typeface="Maven Pro Medium"/>
-              </a:rPr>
-              <a:t>р</a:t>
-            </a:r>
-            <a:r>
-              <a:rPr b="0" lang="en-US" sz="8000" spc="-1" strike="noStrike">
-                <a:solidFill>
-                  <a:srgbClr val="ffffff"/>
-                </a:solidFill>
-                <a:latin typeface="Maven Pro Medium"/>
-                <a:ea typeface="Maven Pro Medium"/>
-              </a:rPr>
-              <a:t>и</a:t>
-            </a:r>
-            <a:r>
-              <a:rPr b="0" lang="en-US" sz="8000" spc="-1" strike="noStrike">
-                <a:solidFill>
-                  <a:srgbClr val="ffffff"/>
-                </a:solidFill>
-                <a:latin typeface="Maven Pro Medium"/>
-                <a:ea typeface="Maven Pro Medium"/>
-              </a:rPr>
-              <a:t>й</a:t>
-            </a:r>
-            <a:r>
-              <a:rPr b="0" lang="en-US" sz="8000" spc="-1" strike="noStrike">
-                <a:solidFill>
-                  <a:srgbClr val="ffffff"/>
-                </a:solidFill>
-                <a:latin typeface="Maven Pro Medium"/>
-                <a:ea typeface="Maven Pro Medium"/>
-              </a:rPr>
-              <a:t> </a:t>
-            </a:r>
-            <a:r>
-              <a:rPr b="0" lang="en-US" sz="8000" spc="-1" strike="noStrike">
-                <a:solidFill>
-                  <a:srgbClr val="ffffff"/>
-                </a:solidFill>
-                <a:latin typeface="Maven Pro Medium"/>
-                <a:ea typeface="Maven Pro Medium"/>
-              </a:rPr>
-              <a:t>и</a:t>
-            </a:r>
-            <a:r>
-              <a:rPr b="0" lang="en-US" sz="8000" spc="-1" strike="noStrike">
-                <a:solidFill>
-                  <a:srgbClr val="ffffff"/>
-                </a:solidFill>
-                <a:latin typeface="Maven Pro Medium"/>
-                <a:ea typeface="Maven Pro Medium"/>
-              </a:rPr>
-              <a:t>с</a:t>
-            </a:r>
-            <a:r>
-              <a:rPr b="0" lang="en-US" sz="8000" spc="-1" strike="noStrike">
-                <a:solidFill>
-                  <a:srgbClr val="ffffff"/>
-                </a:solidFill>
-                <a:latin typeface="Maven Pro Medium"/>
-                <a:ea typeface="Maven Pro Medium"/>
-              </a:rPr>
-              <a:t>п</a:t>
-            </a:r>
-            <a:r>
-              <a:rPr b="0" lang="en-US" sz="8000" spc="-1" strike="noStrike">
-                <a:solidFill>
-                  <a:srgbClr val="ffffff"/>
-                </a:solidFill>
-                <a:latin typeface="Maven Pro Medium"/>
-                <a:ea typeface="Maven Pro Medium"/>
-              </a:rPr>
-              <a:t>о</a:t>
-            </a:r>
-            <a:r>
-              <a:rPr b="0" lang="en-US" sz="8000" spc="-1" strike="noStrike">
-                <a:solidFill>
-                  <a:srgbClr val="ffffff"/>
-                </a:solidFill>
-                <a:latin typeface="Maven Pro Medium"/>
-                <a:ea typeface="Maven Pro Medium"/>
-              </a:rPr>
-              <a:t>л</a:t>
-            </a:r>
-            <a:r>
-              <a:rPr b="0" lang="en-US" sz="8000" spc="-1" strike="noStrike">
-                <a:solidFill>
-                  <a:srgbClr val="ffffff"/>
-                </a:solidFill>
-                <a:latin typeface="Maven Pro Medium"/>
-                <a:ea typeface="Maven Pro Medium"/>
-              </a:rPr>
-              <a:t>ь</a:t>
-            </a:r>
-            <a:r>
-              <a:rPr b="0" lang="en-US" sz="8000" spc="-1" strike="noStrike">
-                <a:solidFill>
-                  <a:srgbClr val="ffffff"/>
-                </a:solidFill>
-                <a:latin typeface="Maven Pro Medium"/>
-                <a:ea typeface="Maven Pro Medium"/>
-              </a:rPr>
-              <a:t>з</a:t>
-            </a:r>
-            <a:r>
-              <a:rPr b="0" lang="en-US" sz="8000" spc="-1" strike="noStrike">
-                <a:solidFill>
-                  <a:srgbClr val="ffffff"/>
-                </a:solidFill>
-                <a:latin typeface="Maven Pro Medium"/>
-                <a:ea typeface="Maven Pro Medium"/>
-              </a:rPr>
-              <a:t>о</a:t>
-            </a:r>
-            <a:r>
-              <a:rPr b="0" lang="en-US" sz="8000" spc="-1" strike="noStrike">
-                <a:solidFill>
-                  <a:srgbClr val="ffffff"/>
-                </a:solidFill>
-                <a:latin typeface="Maven Pro Medium"/>
-                <a:ea typeface="Maven Pro Medium"/>
-              </a:rPr>
-              <a:t>в</a:t>
-            </a:r>
-            <a:r>
-              <a:rPr b="0" lang="en-US" sz="8000" spc="-1" strike="noStrike">
-                <a:solidFill>
-                  <a:srgbClr val="ffffff"/>
-                </a:solidFill>
-                <a:latin typeface="Maven Pro Medium"/>
-                <a:ea typeface="Maven Pro Medium"/>
-              </a:rPr>
-              <a:t>а</a:t>
-            </a:r>
-            <a:r>
-              <a:rPr b="0" lang="en-US" sz="8000" spc="-1" strike="noStrike">
-                <a:solidFill>
-                  <a:srgbClr val="ffffff"/>
-                </a:solidFill>
-                <a:latin typeface="Maven Pro Medium"/>
-                <a:ea typeface="Maven Pro Medium"/>
-              </a:rPr>
-              <a:t>н</a:t>
-            </a:r>
-            <a:r>
-              <a:rPr b="0" lang="en-US" sz="8000" spc="-1" strike="noStrike">
-                <a:solidFill>
-                  <a:srgbClr val="ffffff"/>
-                </a:solidFill>
-                <a:latin typeface="Maven Pro Medium"/>
-                <a:ea typeface="Maven Pro Medium"/>
-              </a:rPr>
-              <a:t>и</a:t>
-            </a:r>
-            <a:r>
-              <a:rPr b="0" lang="en-US" sz="8000" spc="-1" strike="noStrike">
-                <a:solidFill>
-                  <a:srgbClr val="ffffff"/>
-                </a:solidFill>
-                <a:latin typeface="Maven Pro Medium"/>
-                <a:ea typeface="Maven Pro Medium"/>
-              </a:rPr>
-              <a:t>я</a:t>
+              <a:t>Основной сценарий использования</a:t>
             </a:r>
             <a:endParaRPr b="0" lang="en-US" sz="8000" spc="-1" strike="noStrike">
               <a:latin typeface="Arial"/>
@@ -9526,7 +9315,7 @@
       </p:sp>
       <p:pic>
         <p:nvPicPr>
-          <p:cNvPr id="104" name="" descr=""/>
+          <p:cNvPr id="105" name="" descr=""/>
           <p:cNvPicPr/>
           <p:nvPr/>
         </p:nvPicPr>
@@ -9537,7 +9326,7 @@
         <p:spPr>
           <a:xfrm>
             <a:off x="2019240" y="3989160"/>
-            <a:ext cx="20345400" cy="5840640"/>
+            <a:ext cx="20345040" cy="5840280"/>
           </a:xfrm>
           <a:prstGeom prst="rect">
             <a:avLst/>
@@ -9561,7 +9350,7 @@
         <p:txBody>
           <a:bodyPr/>
           <a:p>
-            <a:fld id="{1DF25E9B-01F7-444C-89D5-F79B8E705772}" type="slidenum">
+            <a:fld id="{74543D6F-5661-4C0F-8F33-1BBFA6348C5C}" type="slidenum">
               <a:t>8</a:t>
             </a:fld>
           </a:p>
@@ -9599,14 +9388,14 @@
       </p:grpSpPr>
       <p:sp>
         <p:nvSpPr>
-          <p:cNvPr id="105" name="Title text slide 7"/>
+          <p:cNvPr id="106" name="Title text slide 7"/>
           <p:cNvSpPr/>
           <p:nvPr/>
         </p:nvSpPr>
         <p:spPr>
           <a:xfrm>
-            <a:off x="2394720" y="2072160"/>
-            <a:ext cx="19549800" cy="1321200"/>
+            <a:off x="2394720" y="2072880"/>
+            <a:ext cx="19549440" cy="1319760"/>
           </a:xfrm>
           <a:prstGeom prst="rect">
             <a:avLst/>
@@ -9644,307 +9433,7 @@
                 <a:latin typeface="Maven Pro Medium"/>
                 <a:ea typeface="Maven Pro Medium"/>
               </a:rPr>
-              <a:t>О</a:t>
-            </a:r>
-            <a:r>
-              <a:rPr b="0" lang="en-US" sz="8000" spc="-1" strike="noStrike">
-                <a:solidFill>
-                  <a:srgbClr val="ffffff"/>
-                </a:solidFill>
-                <a:latin typeface="Maven Pro Medium"/>
-                <a:ea typeface="Maven Pro Medium"/>
-              </a:rPr>
-              <a:t>с</a:t>
-            </a:r>
-            <a:r>
-              <a:rPr b="0" lang="en-US" sz="8000" spc="-1" strike="noStrike">
-                <a:solidFill>
-                  <a:srgbClr val="ffffff"/>
-                </a:solidFill>
-                <a:latin typeface="Maven Pro Medium"/>
-                <a:ea typeface="Maven Pro Medium"/>
-              </a:rPr>
-              <a:t>н</a:t>
-            </a:r>
-            <a:r>
-              <a:rPr b="0" lang="en-US" sz="8000" spc="-1" strike="noStrike">
-                <a:solidFill>
-                  <a:srgbClr val="ffffff"/>
-                </a:solidFill>
-                <a:latin typeface="Maven Pro Medium"/>
-                <a:ea typeface="Maven Pro Medium"/>
-              </a:rPr>
-              <a:t>о</a:t>
-            </a:r>
-            <a:r>
-              <a:rPr b="0" lang="en-US" sz="8000" spc="-1" strike="noStrike">
-                <a:solidFill>
-                  <a:srgbClr val="ffffff"/>
-                </a:solidFill>
-                <a:latin typeface="Maven Pro Medium"/>
-                <a:ea typeface="Maven Pro Medium"/>
-              </a:rPr>
-              <a:t>в</a:t>
-            </a:r>
-            <a:r>
-              <a:rPr b="0" lang="en-US" sz="8000" spc="-1" strike="noStrike">
-                <a:solidFill>
-                  <a:srgbClr val="ffffff"/>
-                </a:solidFill>
-                <a:latin typeface="Maven Pro Medium"/>
-                <a:ea typeface="Maven Pro Medium"/>
-              </a:rPr>
-              <a:t>н</a:t>
-            </a:r>
-            <a:r>
-              <a:rPr b="0" lang="en-US" sz="8000" spc="-1" strike="noStrike">
-                <a:solidFill>
-                  <a:srgbClr val="ffffff"/>
-                </a:solidFill>
-                <a:latin typeface="Maven Pro Medium"/>
-                <a:ea typeface="Maven Pro Medium"/>
-              </a:rPr>
-              <a:t>о</a:t>
-            </a:r>
-            <a:r>
-              <a:rPr b="0" lang="en-US" sz="8000" spc="-1" strike="noStrike">
-                <a:solidFill>
-                  <a:srgbClr val="ffffff"/>
-                </a:solidFill>
-                <a:latin typeface="Maven Pro Medium"/>
-                <a:ea typeface="Maven Pro Medium"/>
-              </a:rPr>
-              <a:t>й</a:t>
-            </a:r>
-            <a:r>
-              <a:rPr b="0" lang="en-US" sz="8000" spc="-1" strike="noStrike">
-                <a:solidFill>
-                  <a:srgbClr val="ffffff"/>
-                </a:solidFill>
-                <a:latin typeface="Maven Pro Medium"/>
-                <a:ea typeface="Maven Pro Medium"/>
-              </a:rPr>
-              <a:t> </a:t>
-            </a:r>
-            <a:r>
-              <a:rPr b="0" lang="en-US" sz="8000" spc="-1" strike="noStrike">
-                <a:solidFill>
-                  <a:srgbClr val="ffffff"/>
-                </a:solidFill>
-                <a:latin typeface="Maven Pro Medium"/>
-                <a:ea typeface="Maven Pro Medium"/>
-              </a:rPr>
-              <a:t>с</a:t>
-            </a:r>
-            <a:r>
-              <a:rPr b="0" lang="en-US" sz="8000" spc="-1" strike="noStrike">
-                <a:solidFill>
-                  <a:srgbClr val="ffffff"/>
-                </a:solidFill>
-                <a:latin typeface="Maven Pro Medium"/>
-                <a:ea typeface="Maven Pro Medium"/>
-              </a:rPr>
-              <a:t>ц</a:t>
-            </a:r>
-            <a:r>
-              <a:rPr b="0" lang="en-US" sz="8000" spc="-1" strike="noStrike">
-                <a:solidFill>
-                  <a:srgbClr val="ffffff"/>
-                </a:solidFill>
-                <a:latin typeface="Maven Pro Medium"/>
-                <a:ea typeface="Maven Pro Medium"/>
-              </a:rPr>
-              <a:t>е</a:t>
-            </a:r>
-            <a:r>
-              <a:rPr b="0" lang="en-US" sz="8000" spc="-1" strike="noStrike">
-                <a:solidFill>
-                  <a:srgbClr val="ffffff"/>
-                </a:solidFill>
-                <a:latin typeface="Maven Pro Medium"/>
-                <a:ea typeface="Maven Pro Medium"/>
-              </a:rPr>
-              <a:t>н</a:t>
-            </a:r>
-            <a:r>
-              <a:rPr b="0" lang="en-US" sz="8000" spc="-1" strike="noStrike">
-                <a:solidFill>
-                  <a:srgbClr val="ffffff"/>
-                </a:solidFill>
-                <a:latin typeface="Maven Pro Medium"/>
-                <a:ea typeface="Maven Pro Medium"/>
-              </a:rPr>
-              <a:t>а</a:t>
-            </a:r>
-            <a:r>
-              <a:rPr b="0" lang="en-US" sz="8000" spc="-1" strike="noStrike">
-                <a:solidFill>
-                  <a:srgbClr val="ffffff"/>
-                </a:solidFill>
-                <a:latin typeface="Maven Pro Medium"/>
-                <a:ea typeface="Maven Pro Medium"/>
-              </a:rPr>
-              <a:t>р</a:t>
-            </a:r>
-            <a:r>
-              <a:rPr b="0" lang="en-US" sz="8000" spc="-1" strike="noStrike">
-                <a:solidFill>
-                  <a:srgbClr val="ffffff"/>
-                </a:solidFill>
-                <a:latin typeface="Maven Pro Medium"/>
-                <a:ea typeface="Maven Pro Medium"/>
-              </a:rPr>
-              <a:t>и</a:t>
-            </a:r>
-            <a:r>
-              <a:rPr b="0" lang="en-US" sz="8000" spc="-1" strike="noStrike">
-                <a:solidFill>
-                  <a:srgbClr val="ffffff"/>
-                </a:solidFill>
-                <a:latin typeface="Maven Pro Medium"/>
-                <a:ea typeface="Maven Pro Medium"/>
-              </a:rPr>
-              <a:t>й</a:t>
-            </a:r>
-            <a:r>
-              <a:rPr b="0" lang="en-US" sz="8000" spc="-1" strike="noStrike">
-                <a:solidFill>
-                  <a:srgbClr val="ffffff"/>
-                </a:solidFill>
-                <a:latin typeface="Maven Pro Medium"/>
-                <a:ea typeface="Maven Pro Medium"/>
-              </a:rPr>
-              <a:t> </a:t>
-            </a:r>
-            <a:r>
-              <a:rPr b="0" lang="en-US" sz="8000" spc="-1" strike="noStrike">
-                <a:solidFill>
-                  <a:srgbClr val="ffffff"/>
-                </a:solidFill>
-                <a:latin typeface="Maven Pro Medium"/>
-                <a:ea typeface="Maven Pro Medium"/>
-              </a:rPr>
-              <a:t>и</a:t>
-            </a:r>
-            <a:r>
-              <a:rPr b="0" lang="en-US" sz="8000" spc="-1" strike="noStrike">
-                <a:solidFill>
-                  <a:srgbClr val="ffffff"/>
-                </a:solidFill>
-                <a:latin typeface="Maven Pro Medium"/>
-                <a:ea typeface="Maven Pro Medium"/>
-              </a:rPr>
-              <a:t>с</a:t>
-            </a:r>
-            <a:r>
-              <a:rPr b="0" lang="en-US" sz="8000" spc="-1" strike="noStrike">
-                <a:solidFill>
-                  <a:srgbClr val="ffffff"/>
-                </a:solidFill>
-                <a:latin typeface="Maven Pro Medium"/>
-                <a:ea typeface="Maven Pro Medium"/>
-              </a:rPr>
-              <a:t>п</a:t>
-            </a:r>
-            <a:r>
-              <a:rPr b="0" lang="en-US" sz="8000" spc="-1" strike="noStrike">
-                <a:solidFill>
-                  <a:srgbClr val="ffffff"/>
-                </a:solidFill>
-                <a:latin typeface="Maven Pro Medium"/>
-                <a:ea typeface="Maven Pro Medium"/>
-              </a:rPr>
-              <a:t>о</a:t>
-            </a:r>
-            <a:r>
-              <a:rPr b="0" lang="en-US" sz="8000" spc="-1" strike="noStrike">
-                <a:solidFill>
-                  <a:srgbClr val="ffffff"/>
-                </a:solidFill>
-                <a:latin typeface="Maven Pro Medium"/>
-                <a:ea typeface="Maven Pro Medium"/>
-              </a:rPr>
-              <a:t>л</a:t>
-            </a:r>
-            <a:r>
-              <a:rPr b="0" lang="en-US" sz="8000" spc="-1" strike="noStrike">
-                <a:solidFill>
-                  <a:srgbClr val="ffffff"/>
-                </a:solidFill>
-                <a:latin typeface="Maven Pro Medium"/>
-                <a:ea typeface="Maven Pro Medium"/>
-              </a:rPr>
-              <a:t>ь</a:t>
-            </a:r>
-            <a:r>
-              <a:rPr b="0" lang="en-US" sz="8000" spc="-1" strike="noStrike">
-                <a:solidFill>
-                  <a:srgbClr val="ffffff"/>
-                </a:solidFill>
-                <a:latin typeface="Maven Pro Medium"/>
-                <a:ea typeface="Maven Pro Medium"/>
-              </a:rPr>
-              <a:t>з</a:t>
-            </a:r>
-            <a:r>
-              <a:rPr b="0" lang="en-US" sz="8000" spc="-1" strike="noStrike">
-                <a:solidFill>
-                  <a:srgbClr val="ffffff"/>
-                </a:solidFill>
-                <a:latin typeface="Maven Pro Medium"/>
-                <a:ea typeface="Maven Pro Medium"/>
-              </a:rPr>
-              <a:t>о</a:t>
-            </a:r>
-            <a:r>
-              <a:rPr b="0" lang="en-US" sz="8000" spc="-1" strike="noStrike">
-                <a:solidFill>
-                  <a:srgbClr val="ffffff"/>
-                </a:solidFill>
-                <a:latin typeface="Maven Pro Medium"/>
-                <a:ea typeface="Maven Pro Medium"/>
-              </a:rPr>
-              <a:t>в</a:t>
-            </a:r>
-            <a:r>
-              <a:rPr b="0" lang="en-US" sz="8000" spc="-1" strike="noStrike">
-                <a:solidFill>
-                  <a:srgbClr val="ffffff"/>
-                </a:solidFill>
-                <a:latin typeface="Maven Pro Medium"/>
-                <a:ea typeface="Maven Pro Medium"/>
-              </a:rPr>
-              <a:t>а</a:t>
-            </a:r>
-            <a:r>
-              <a:rPr b="0" lang="en-US" sz="8000" spc="-1" strike="noStrike">
-                <a:solidFill>
-                  <a:srgbClr val="ffffff"/>
-                </a:solidFill>
-                <a:latin typeface="Maven Pro Medium"/>
-                <a:ea typeface="Maven Pro Medium"/>
-              </a:rPr>
-              <a:t>н</a:t>
-            </a:r>
-            <a:r>
-              <a:rPr b="0" lang="en-US" sz="8000" spc="-1" strike="noStrike">
-                <a:solidFill>
-                  <a:srgbClr val="ffffff"/>
-                </a:solidFill>
-                <a:latin typeface="Maven Pro Medium"/>
-                <a:ea typeface="Maven Pro Medium"/>
-              </a:rPr>
-              <a:t>и</a:t>
-            </a:r>
-            <a:r>
-              <a:rPr b="0" lang="en-US" sz="8000" spc="-1" strike="noStrike">
-                <a:solidFill>
-                  <a:srgbClr val="ffffff"/>
-                </a:solidFill>
-                <a:latin typeface="Maven Pro Medium"/>
-                <a:ea typeface="Maven Pro Medium"/>
-              </a:rPr>
-              <a:t>я</a:t>
+              <a:t>Основной сценарий использования</a:t>
             </a:r>
             <a:endParaRPr b="0" lang="en-US" sz="8000" spc="-1" strike="noStrike">
               <a:latin typeface="Arial"/>
@@ -9954,7 +9443,7 @@
       </p:sp>
       <p:pic>
         <p:nvPicPr>
-          <p:cNvPr id="106" name="" descr=""/>
+          <p:cNvPr id="107" name="" descr=""/>
           <p:cNvPicPr/>
           <p:nvPr/>
         </p:nvPicPr>
@@ -9965,7 +9454,7 @@
         <p:spPr>
           <a:xfrm>
             <a:off x="2019240" y="3657600"/>
-            <a:ext cx="20345400" cy="9104760"/>
+            <a:ext cx="20345040" cy="9104400"/>
           </a:xfrm>
           <a:prstGeom prst="rect">
             <a:avLst/>
@@ -9989,7 +9478,7 @@
         <p:txBody>
           <a:bodyPr/>
           <a:p>
-            <a:fld id="{C8970BC1-E423-43DF-97CB-253E3D258BB8}" type="slidenum">
+            <a:fld id="{56B08454-545B-4284-9219-12C872F70527}" type="slidenum">
               <a:t>9</a:t>
             </a:fld>
           </a:p>

</xml_diff>